<commit_message>
Deleted slide from slides. :D
</commit_message>
<xml_diff>
--- a/doc/Slides/ballwall_slides.pptx
+++ b/doc/Slides/ballwall_slides.pptx
@@ -19,9 +19,8 @@
     <p:sldId id="276" r:id="rId13"/>
     <p:sldId id="269" r:id="rId14"/>
     <p:sldId id="260" r:id="rId15"/>
-    <p:sldId id="265" r:id="rId16"/>
-    <p:sldId id="263" r:id="rId17"/>
-    <p:sldId id="277" r:id="rId18"/>
+    <p:sldId id="263" r:id="rId16"/>
+    <p:sldId id="277" r:id="rId17"/>
   </p:sldIdLst>
   <p:sldSz cx="12192000" cy="6858000"/>
   <p:notesSz cx="6858000" cy="9144000"/>
@@ -5750,14 +5749,6 @@
 <file path=ppt/slides/slide15.xml><?xml version="1.0" encoding="utf-8"?>
 <p:sld xmlns:a="http://schemas.openxmlformats.org/drawingml/2006/main" xmlns:r="http://schemas.openxmlformats.org/officeDocument/2006/relationships" xmlns:p="http://schemas.openxmlformats.org/presentationml/2006/main">
   <p:cSld>
-    <p:bg>
-      <p:bgPr>
-        <a:solidFill>
-          <a:schemeClr val="bg2"/>
-        </a:solidFill>
-        <a:effectLst/>
-      </p:bgPr>
-    </p:bg>
     <p:spTree>
       <p:nvGrpSpPr>
         <p:cNvPr id="1" name=""/>
@@ -5774,391 +5765,6 @@
       </p:grpSpPr>
       <p:sp>
         <p:nvSpPr>
-          <p:cNvPr id="10" name="Rectangle 9">
-            <a:extLst>
-              <a:ext uri="{FF2B5EF4-FFF2-40B4-BE49-F238E27FC236}">
-                <a16:creationId xmlns:a16="http://schemas.microsoft.com/office/drawing/2014/main" id="{C1CEA5B3-F026-4EA7-8ECF-E1F5465E5684}"/>
-              </a:ext>
-              <a:ext uri="{C183D7F6-B498-43B3-948B-1728B52AA6E4}">
-                <adec:decorative xmlns:adec="http://schemas.microsoft.com/office/drawing/2017/decorative" val="1"/>
-              </a:ext>
-            </a:extLst>
-          </p:cNvPr>
-          <p:cNvSpPr>
-            <a:spLocks noGrp="1" noRot="1" noChangeAspect="1" noMove="1" noResize="1" noEditPoints="1" noAdjustHandles="1" noChangeArrowheads="1" noChangeShapeType="1" noTextEdit="1"/>
-          </p:cNvSpPr>
-          <p:nvPr>
-            <p:extLst>
-              <p:ext uri="{386F3935-93C4-4BCD-93E2-E3B085C9AB24}">
-                <p16:designElem xmlns:p16="http://schemas.microsoft.com/office/powerpoint/2015/main" val="1"/>
-              </p:ext>
-            </p:extLst>
-          </p:nvPr>
-        </p:nvSpPr>
-        <p:spPr>
-          <a:xfrm>
-            <a:off x="3175" y="6400800"/>
-            <a:ext cx="12188825" cy="457200"/>
-          </a:xfrm>
-          <a:prstGeom prst="rect">
-            <a:avLst/>
-          </a:prstGeom>
-          <a:solidFill>
-            <a:schemeClr val="accent1">
-              <a:lumMod val="50000"/>
-            </a:schemeClr>
-          </a:solidFill>
-          <a:ln>
-            <a:noFill/>
-          </a:ln>
-        </p:spPr>
-        <p:style>
-          <a:lnRef idx="2">
-            <a:schemeClr val="accent1">
-              <a:shade val="50000"/>
-            </a:schemeClr>
-          </a:lnRef>
-          <a:fillRef idx="1">
-            <a:schemeClr val="accent1"/>
-          </a:fillRef>
-          <a:effectRef idx="0">
-            <a:schemeClr val="accent1"/>
-          </a:effectRef>
-          <a:fontRef idx="minor">
-            <a:schemeClr val="lt1"/>
-          </a:fontRef>
-        </p:style>
-      </p:sp>
-      <p:sp>
-        <p:nvSpPr>
-          <p:cNvPr id="12" name="Rectangle 11">
-            <a:extLst>
-              <a:ext uri="{FF2B5EF4-FFF2-40B4-BE49-F238E27FC236}">
-                <a16:creationId xmlns:a16="http://schemas.microsoft.com/office/drawing/2014/main" id="{4B486FE1-17CE-45A4-9CBC-8C0B185E1963}"/>
-              </a:ext>
-              <a:ext uri="{C183D7F6-B498-43B3-948B-1728B52AA6E4}">
-                <adec:decorative xmlns:adec="http://schemas.microsoft.com/office/drawing/2017/decorative" val="1"/>
-              </a:ext>
-            </a:extLst>
-          </p:cNvPr>
-          <p:cNvSpPr>
-            <a:spLocks noGrp="1" noRot="1" noChangeAspect="1" noMove="1" noResize="1" noEditPoints="1" noAdjustHandles="1" noChangeArrowheads="1" noChangeShapeType="1" noTextEdit="1"/>
-          </p:cNvSpPr>
-          <p:nvPr>
-            <p:extLst>
-              <p:ext uri="{386F3935-93C4-4BCD-93E2-E3B085C9AB24}">
-                <p16:designElem xmlns:p16="http://schemas.microsoft.com/office/powerpoint/2015/main" val="1"/>
-              </p:ext>
-            </p:extLst>
-          </p:nvPr>
-        </p:nvSpPr>
-        <p:spPr>
-          <a:xfrm>
-            <a:off x="15" y="6334316"/>
-            <a:ext cx="12188825" cy="64008"/>
-          </a:xfrm>
-          <a:prstGeom prst="rect">
-            <a:avLst/>
-          </a:prstGeom>
-          <a:solidFill>
-            <a:schemeClr val="accent1"/>
-          </a:solidFill>
-          <a:ln>
-            <a:noFill/>
-          </a:ln>
-        </p:spPr>
-        <p:style>
-          <a:lnRef idx="2">
-            <a:schemeClr val="accent1">
-              <a:shade val="50000"/>
-            </a:schemeClr>
-          </a:lnRef>
-          <a:fillRef idx="1">
-            <a:schemeClr val="accent1"/>
-          </a:fillRef>
-          <a:effectRef idx="0">
-            <a:schemeClr val="accent1"/>
-          </a:effectRef>
-          <a:fontRef idx="minor">
-            <a:schemeClr val="lt1"/>
-          </a:fontRef>
-        </p:style>
-      </p:sp>
-      <p:cxnSp>
-        <p:nvCxnSpPr>
-          <p:cNvPr id="14" name="Straight Connector 13">
-            <a:extLst>
-              <a:ext uri="{FF2B5EF4-FFF2-40B4-BE49-F238E27FC236}">
-                <a16:creationId xmlns:a16="http://schemas.microsoft.com/office/drawing/2014/main" id="{2AF0217B-4943-4BF1-8CDF-A5FB04C876DA}"/>
-              </a:ext>
-              <a:ext uri="{C183D7F6-B498-43B3-948B-1728B52AA6E4}">
-                <adec:decorative xmlns:adec="http://schemas.microsoft.com/office/drawing/2017/decorative" val="1"/>
-              </a:ext>
-            </a:extLst>
-          </p:cNvPr>
-          <p:cNvCxnSpPr>
-            <a:cxnSpLocks noGrp="1" noRot="1" noChangeAspect="1" noMove="1" noResize="1" noEditPoints="1" noAdjustHandles="1" noChangeArrowheads="1" noChangeShapeType="1"/>
-          </p:cNvCxnSpPr>
-          <p:nvPr>
-            <p:extLst>
-              <p:ext uri="{386F3935-93C4-4BCD-93E2-E3B085C9AB24}">
-                <p16:designElem xmlns:p16="http://schemas.microsoft.com/office/powerpoint/2015/main" val="1"/>
-              </p:ext>
-            </p:extLst>
-          </p:nvPr>
-        </p:nvCxnSpPr>
-        <p:spPr>
-          <a:xfrm>
-            <a:off x="1207658" y="4343400"/>
-            <a:ext cx="9875520" cy="0"/>
-          </a:xfrm>
-          <a:prstGeom prst="line">
-            <a:avLst/>
-          </a:prstGeom>
-          <a:ln w="6350">
-            <a:solidFill>
-              <a:schemeClr val="tx1">
-                <a:lumMod val="50000"/>
-                <a:lumOff val="50000"/>
-              </a:schemeClr>
-            </a:solidFill>
-          </a:ln>
-        </p:spPr>
-        <p:style>
-          <a:lnRef idx="1">
-            <a:schemeClr val="accent1"/>
-          </a:lnRef>
-          <a:fillRef idx="0">
-            <a:schemeClr val="accent1"/>
-          </a:fillRef>
-          <a:effectRef idx="0">
-            <a:schemeClr val="accent1"/>
-          </a:effectRef>
-          <a:fontRef idx="minor">
-            <a:schemeClr val="tx1"/>
-          </a:fontRef>
-        </p:style>
-      </p:cxnSp>
-      <p:pic>
-        <p:nvPicPr>
-          <p:cNvPr id="5" name="Inhaltsplatzhalter 4" descr="Ein Bild, das Text, grün, Screenshot enthält.&#10;&#10;Automatisch generierte Beschreibung">
-            <a:extLst>
-              <a:ext uri="{FF2B5EF4-FFF2-40B4-BE49-F238E27FC236}">
-                <a16:creationId xmlns:a16="http://schemas.microsoft.com/office/drawing/2014/main" id="{0709819E-0DD3-433C-A22C-2FB7D51A7E09}"/>
-              </a:ext>
-            </a:extLst>
-          </p:cNvPr>
-          <p:cNvPicPr>
-            <a:picLocks noGrp="1" noChangeAspect="1"/>
-          </p:cNvPicPr>
-          <p:nvPr>
-            <p:ph idx="1"/>
-          </p:nvPr>
-        </p:nvPicPr>
-        <p:blipFill rotWithShape="1">
-          <a:blip r:embed="rId2">
-            <a:extLst>
-              <a:ext uri="{28A0092B-C50C-407E-A947-70E740481C1C}">
-                <a14:useLocalDpi xmlns:a14="http://schemas.microsoft.com/office/drawing/2010/main" val="0"/>
-              </a:ext>
-            </a:extLst>
-          </a:blip>
-          <a:srcRect b="2269"/>
-          <a:stretch/>
-        </p:blipFill>
-        <p:spPr>
-          <a:xfrm>
-            <a:off x="-32" y="10"/>
-            <a:ext cx="12192031" cy="4915066"/>
-          </a:xfrm>
-          <a:prstGeom prst="rect">
-            <a:avLst/>
-          </a:prstGeom>
-        </p:spPr>
-      </p:pic>
-      <p:sp>
-        <p:nvSpPr>
-          <p:cNvPr id="16" name="Rectangle 15">
-            <a:extLst>
-              <a:ext uri="{FF2B5EF4-FFF2-40B4-BE49-F238E27FC236}">
-                <a16:creationId xmlns:a16="http://schemas.microsoft.com/office/drawing/2014/main" id="{947A5FA4-F7D9-4BD2-BCEA-016B70DC8E02}"/>
-              </a:ext>
-              <a:ext uri="{C183D7F6-B498-43B3-948B-1728B52AA6E4}">
-                <adec:decorative xmlns:adec="http://schemas.microsoft.com/office/drawing/2017/decorative" val="1"/>
-              </a:ext>
-            </a:extLst>
-          </p:cNvPr>
-          <p:cNvSpPr>
-            <a:spLocks noGrp="1" noRot="1" noChangeAspect="1" noMove="1" noResize="1" noEditPoints="1" noAdjustHandles="1" noChangeArrowheads="1" noChangeShapeType="1" noTextEdit="1"/>
-          </p:cNvSpPr>
-          <p:nvPr>
-            <p:extLst>
-              <p:ext uri="{386F3935-93C4-4BCD-93E2-E3B085C9AB24}">
-                <p16:designElem xmlns:p16="http://schemas.microsoft.com/office/powerpoint/2015/main" val="1"/>
-              </p:ext>
-            </p:extLst>
-          </p:nvPr>
-        </p:nvSpPr>
-        <p:spPr bwMode="white">
-          <a:xfrm>
-            <a:off x="1507" y="4953000"/>
-            <a:ext cx="12188952" cy="1905000"/>
-          </a:xfrm>
-          <a:prstGeom prst="rect">
-            <a:avLst/>
-          </a:prstGeom>
-          <a:solidFill>
-            <a:schemeClr val="accent1">
-              <a:lumMod val="50000"/>
-            </a:schemeClr>
-          </a:solidFill>
-          <a:ln>
-            <a:noFill/>
-          </a:ln>
-        </p:spPr>
-        <p:style>
-          <a:lnRef idx="2">
-            <a:schemeClr val="accent1">
-              <a:shade val="50000"/>
-            </a:schemeClr>
-          </a:lnRef>
-          <a:fillRef idx="1">
-            <a:schemeClr val="accent1"/>
-          </a:fillRef>
-          <a:effectRef idx="0">
-            <a:schemeClr val="accent1"/>
-          </a:effectRef>
-          <a:fontRef idx="minor">
-            <a:schemeClr val="lt1"/>
-          </a:fontRef>
-        </p:style>
-      </p:sp>
-      <p:sp>
-        <p:nvSpPr>
-          <p:cNvPr id="2" name="Titel 1">
-            <a:extLst>
-              <a:ext uri="{FF2B5EF4-FFF2-40B4-BE49-F238E27FC236}">
-                <a16:creationId xmlns:a16="http://schemas.microsoft.com/office/drawing/2014/main" id="{5F77DC0F-107D-491A-8C25-B0825FC5BEB1}"/>
-              </a:ext>
-            </a:extLst>
-          </p:cNvPr>
-          <p:cNvSpPr>
-            <a:spLocks noGrp="1"/>
-          </p:cNvSpPr>
-          <p:nvPr>
-            <p:ph type="title"/>
-          </p:nvPr>
-        </p:nvSpPr>
-        <p:spPr>
-          <a:xfrm>
-            <a:off x="1065197" y="5120640"/>
-            <a:ext cx="10058400" cy="822960"/>
-          </a:xfrm>
-        </p:spPr>
-        <p:txBody>
-          <a:bodyPr vert="horz" lIns="91440" tIns="45720" rIns="91440" bIns="45720" rtlCol="0" anchor="b">
-            <a:normAutofit/>
-          </a:bodyPr>
-          <a:lstStyle/>
-          <a:p>
-            <a:r>
-              <a:rPr lang="en-US" sz="3600" dirty="0">
-                <a:solidFill>
-                  <a:srgbClr val="FFFFFF"/>
-                </a:solidFill>
-              </a:rPr>
-              <a:t>Creating walls</a:t>
-            </a:r>
-          </a:p>
-        </p:txBody>
-      </p:sp>
-      <p:sp>
-        <p:nvSpPr>
-          <p:cNvPr id="18" name="Rectangle 17">
-            <a:extLst>
-              <a:ext uri="{FF2B5EF4-FFF2-40B4-BE49-F238E27FC236}">
-                <a16:creationId xmlns:a16="http://schemas.microsoft.com/office/drawing/2014/main" id="{D5AADE08-A85D-4367-AF35-82927B65BCD5}"/>
-              </a:ext>
-              <a:ext uri="{C183D7F6-B498-43B3-948B-1728B52AA6E4}">
-                <adec:decorative xmlns:adec="http://schemas.microsoft.com/office/drawing/2017/decorative" val="1"/>
-              </a:ext>
-            </a:extLst>
-          </p:cNvPr>
-          <p:cNvSpPr>
-            <a:spLocks noGrp="1" noRot="1" noChangeAspect="1" noMove="1" noResize="1" noEditPoints="1" noAdjustHandles="1" noChangeArrowheads="1" noChangeShapeType="1" noTextEdit="1"/>
-          </p:cNvSpPr>
-          <p:nvPr>
-            <p:extLst>
-              <p:ext uri="{386F3935-93C4-4BCD-93E2-E3B085C9AB24}">
-                <p16:designElem xmlns:p16="http://schemas.microsoft.com/office/powerpoint/2015/main" val="1"/>
-              </p:ext>
-            </p:extLst>
-          </p:nvPr>
-        </p:nvSpPr>
-        <p:spPr>
-          <a:xfrm>
-            <a:off x="1507" y="4906176"/>
-            <a:ext cx="12188952" cy="64008"/>
-          </a:xfrm>
-          <a:prstGeom prst="rect">
-            <a:avLst/>
-          </a:prstGeom>
-          <a:solidFill>
-            <a:schemeClr val="accent1"/>
-          </a:solidFill>
-          <a:ln>
-            <a:noFill/>
-          </a:ln>
-        </p:spPr>
-        <p:style>
-          <a:lnRef idx="2">
-            <a:schemeClr val="accent1">
-              <a:shade val="50000"/>
-            </a:schemeClr>
-          </a:lnRef>
-          <a:fillRef idx="1">
-            <a:schemeClr val="accent1"/>
-          </a:fillRef>
-          <a:effectRef idx="0">
-            <a:schemeClr val="accent1"/>
-          </a:effectRef>
-          <a:fontRef idx="minor">
-            <a:schemeClr val="lt1"/>
-          </a:fontRef>
-        </p:style>
-      </p:sp>
-    </p:spTree>
-    <p:extLst>
-      <p:ext uri="{BB962C8B-B14F-4D97-AF65-F5344CB8AC3E}">
-        <p14:creationId xmlns:p14="http://schemas.microsoft.com/office/powerpoint/2010/main" val="556370433"/>
-      </p:ext>
-    </p:extLst>
-  </p:cSld>
-  <p:clrMapOvr>
-    <a:masterClrMapping/>
-  </p:clrMapOvr>
-</p:sld>
-</file>
-
-<file path=ppt/slides/slide16.xml><?xml version="1.0" encoding="utf-8"?>
-<p:sld xmlns:a="http://schemas.openxmlformats.org/drawingml/2006/main" xmlns:r="http://schemas.openxmlformats.org/officeDocument/2006/relationships" xmlns:p="http://schemas.openxmlformats.org/presentationml/2006/main">
-  <p:cSld>
-    <p:spTree>
-      <p:nvGrpSpPr>
-        <p:cNvPr id="1" name=""/>
-        <p:cNvGrpSpPr/>
-        <p:nvPr/>
-      </p:nvGrpSpPr>
-      <p:grpSpPr>
-        <a:xfrm>
-          <a:off x="0" y="0"/>
-          <a:ext cx="0" cy="0"/>
-          <a:chOff x="0" y="0"/>
-          <a:chExt cx="0" cy="0"/>
-        </a:xfrm>
-      </p:grpSpPr>
-      <p:sp>
-        <p:nvSpPr>
           <p:cNvPr id="2" name="Titel 1">
             <a:extLst>
               <a:ext uri="{FF2B5EF4-FFF2-40B4-BE49-F238E27FC236}">
@@ -6224,7 +5830,7 @@
 </p:sld>
 </file>
 
-<file path=ppt/slides/slide17.xml><?xml version="1.0" encoding="utf-8"?>
+<file path=ppt/slides/slide16.xml><?xml version="1.0" encoding="utf-8"?>
 <p:sld xmlns:a="http://schemas.openxmlformats.org/drawingml/2006/main" xmlns:r="http://schemas.openxmlformats.org/officeDocument/2006/relationships" xmlns:p="http://schemas.openxmlformats.org/presentationml/2006/main" showMasterSp="0">
   <p:cSld>
     <p:spTree>

</xml_diff>